<commit_message>
заменен FetchType.LAZY на FetchType.EAGER
</commit_message>
<xml_diff>
--- a/Presentation/Информационная система брокерского обслуживания.pptx
+++ b/Presentation/Информационная система брокерского обслуживания.pptx
@@ -6,14 +6,15 @@
   </p:sldMasterIdLst>
   <p:sldIdLst>
     <p:sldId id="256" r:id="rId2"/>
-    <p:sldId id="257" r:id="rId3"/>
-    <p:sldId id="258" r:id="rId4"/>
-    <p:sldId id="259" r:id="rId5"/>
-    <p:sldId id="260" r:id="rId6"/>
-    <p:sldId id="261" r:id="rId7"/>
-    <p:sldId id="262" r:id="rId8"/>
-    <p:sldId id="263" r:id="rId9"/>
-    <p:sldId id="264" r:id="rId10"/>
+    <p:sldId id="265" r:id="rId3"/>
+    <p:sldId id="257" r:id="rId4"/>
+    <p:sldId id="258" r:id="rId5"/>
+    <p:sldId id="259" r:id="rId6"/>
+    <p:sldId id="260" r:id="rId7"/>
+    <p:sldId id="261" r:id="rId8"/>
+    <p:sldId id="262" r:id="rId9"/>
+    <p:sldId id="263" r:id="rId10"/>
+    <p:sldId id="264" r:id="rId11"/>
   </p:sldIdLst>
   <p:sldSz cx="12192000" cy="6858000"/>
   <p:notesSz cx="6858000" cy="9144000"/>
@@ -249,7 +250,7 @@
           <a:p>
             <a:fld id="{DB4E80FC-582B-4D39-8ACE-1C8D78A9EFC1}" type="datetimeFigureOut">
               <a:rPr lang="ru-RU" smtClean="0"/>
-              <a:t>13.05.2020</a:t>
+              <a:t>14.05.2020</a:t>
             </a:fld>
             <a:endParaRPr lang="ru-RU"/>
           </a:p>
@@ -417,7 +418,7 @@
           <a:p>
             <a:fld id="{DB4E80FC-582B-4D39-8ACE-1C8D78A9EFC1}" type="datetimeFigureOut">
               <a:rPr lang="ru-RU" smtClean="0"/>
-              <a:t>13.05.2020</a:t>
+              <a:t>14.05.2020</a:t>
             </a:fld>
             <a:endParaRPr lang="ru-RU"/>
           </a:p>
@@ -595,7 +596,7 @@
           <a:p>
             <a:fld id="{DB4E80FC-582B-4D39-8ACE-1C8D78A9EFC1}" type="datetimeFigureOut">
               <a:rPr lang="ru-RU" smtClean="0"/>
-              <a:t>13.05.2020</a:t>
+              <a:t>14.05.2020</a:t>
             </a:fld>
             <a:endParaRPr lang="ru-RU"/>
           </a:p>
@@ -763,7 +764,7 @@
           <a:p>
             <a:fld id="{DB4E80FC-582B-4D39-8ACE-1C8D78A9EFC1}" type="datetimeFigureOut">
               <a:rPr lang="ru-RU" smtClean="0"/>
-              <a:t>13.05.2020</a:t>
+              <a:t>14.05.2020</a:t>
             </a:fld>
             <a:endParaRPr lang="ru-RU"/>
           </a:p>
@@ -1008,7 +1009,7 @@
           <a:p>
             <a:fld id="{DB4E80FC-582B-4D39-8ACE-1C8D78A9EFC1}" type="datetimeFigureOut">
               <a:rPr lang="ru-RU" smtClean="0"/>
-              <a:t>13.05.2020</a:t>
+              <a:t>14.05.2020</a:t>
             </a:fld>
             <a:endParaRPr lang="ru-RU"/>
           </a:p>
@@ -1237,7 +1238,7 @@
           <a:p>
             <a:fld id="{DB4E80FC-582B-4D39-8ACE-1C8D78A9EFC1}" type="datetimeFigureOut">
               <a:rPr lang="ru-RU" smtClean="0"/>
-              <a:t>13.05.2020</a:t>
+              <a:t>14.05.2020</a:t>
             </a:fld>
             <a:endParaRPr lang="ru-RU"/>
           </a:p>
@@ -1601,7 +1602,7 @@
           <a:p>
             <a:fld id="{DB4E80FC-582B-4D39-8ACE-1C8D78A9EFC1}" type="datetimeFigureOut">
               <a:rPr lang="ru-RU" smtClean="0"/>
-              <a:t>13.05.2020</a:t>
+              <a:t>14.05.2020</a:t>
             </a:fld>
             <a:endParaRPr lang="ru-RU"/>
           </a:p>
@@ -1718,7 +1719,7 @@
           <a:p>
             <a:fld id="{DB4E80FC-582B-4D39-8ACE-1C8D78A9EFC1}" type="datetimeFigureOut">
               <a:rPr lang="ru-RU" smtClean="0"/>
-              <a:t>13.05.2020</a:t>
+              <a:t>14.05.2020</a:t>
             </a:fld>
             <a:endParaRPr lang="ru-RU"/>
           </a:p>
@@ -1813,7 +1814,7 @@
           <a:p>
             <a:fld id="{DB4E80FC-582B-4D39-8ACE-1C8D78A9EFC1}" type="datetimeFigureOut">
               <a:rPr lang="ru-RU" smtClean="0"/>
-              <a:t>13.05.2020</a:t>
+              <a:t>14.05.2020</a:t>
             </a:fld>
             <a:endParaRPr lang="ru-RU"/>
           </a:p>
@@ -2088,7 +2089,7 @@
           <a:p>
             <a:fld id="{DB4E80FC-582B-4D39-8ACE-1C8D78A9EFC1}" type="datetimeFigureOut">
               <a:rPr lang="ru-RU" smtClean="0"/>
-              <a:t>13.05.2020</a:t>
+              <a:t>14.05.2020</a:t>
             </a:fld>
             <a:endParaRPr lang="ru-RU"/>
           </a:p>
@@ -2340,7 +2341,7 @@
           <a:p>
             <a:fld id="{DB4E80FC-582B-4D39-8ACE-1C8D78A9EFC1}" type="datetimeFigureOut">
               <a:rPr lang="ru-RU" smtClean="0"/>
-              <a:t>13.05.2020</a:t>
+              <a:t>14.05.2020</a:t>
             </a:fld>
             <a:endParaRPr lang="ru-RU"/>
           </a:p>
@@ -2551,7 +2552,7 @@
           <a:p>
             <a:fld id="{DB4E80FC-582B-4D39-8ACE-1C8D78A9EFC1}" type="datetimeFigureOut">
               <a:rPr lang="ru-RU" smtClean="0"/>
-              <a:t>13.05.2020</a:t>
+              <a:t>14.05.2020</a:t>
             </a:fld>
             <a:endParaRPr lang="ru-RU"/>
           </a:p>
@@ -3248,7 +3249,7 @@
                   <a:srgbClr val="6600FF"/>
                 </a:solidFill>
               </a:rPr>
-              <a:t>Автор: Красилова Марина Ивановна</a:t>
+              <a:t>Автор: Красилова Марина</a:t>
             </a:r>
           </a:p>
         </p:txBody>
@@ -3326,6 +3327,201 @@
 </p:sld>
 </file>
 
+<file path=ppt/slides/slide10.xml><?xml version="1.0" encoding="utf-8"?>
+<p:sld xmlns:a="http://schemas.openxmlformats.org/drawingml/2006/main" xmlns:r="http://schemas.openxmlformats.org/officeDocument/2006/relationships" xmlns:p="http://schemas.openxmlformats.org/presentationml/2006/main">
+  <p:cSld>
+    <p:spTree>
+      <p:nvGrpSpPr>
+        <p:cNvPr id="1" name=""/>
+        <p:cNvGrpSpPr/>
+        <p:nvPr/>
+      </p:nvGrpSpPr>
+      <p:grpSpPr>
+        <a:xfrm>
+          <a:off x="0" y="0"/>
+          <a:ext cx="0" cy="0"/>
+          <a:chOff x="0" y="0"/>
+          <a:chExt cx="0" cy="0"/>
+        </a:xfrm>
+      </p:grpSpPr>
+      <p:sp>
+        <p:nvSpPr>
+          <p:cNvPr id="5" name="Заголовок 1"/>
+          <p:cNvSpPr txBox="1">
+            <a:spLocks/>
+          </p:cNvSpPr>
+          <p:nvPr/>
+        </p:nvSpPr>
+        <p:spPr>
+          <a:xfrm>
+            <a:off x="4532812" y="0"/>
+            <a:ext cx="8493034" cy="1325563"/>
+          </a:xfrm>
+          <a:prstGeom prst="rect">
+            <a:avLst/>
+          </a:prstGeom>
+        </p:spPr>
+        <p:txBody>
+          <a:bodyPr vert="horz" lIns="91440" tIns="45720" rIns="91440" bIns="45720" rtlCol="0" anchor="ctr">
+            <a:normAutofit/>
+          </a:bodyPr>
+          <a:lstStyle>
+            <a:lvl1pPr algn="l" defTabSz="914400" rtl="0" eaLnBrk="1" latinLnBrk="0" hangingPunct="1">
+              <a:lnSpc>
+                <a:spcPct val="90000"/>
+              </a:lnSpc>
+              <a:spcBef>
+                <a:spcPct val="0"/>
+              </a:spcBef>
+              <a:buNone/>
+              <a:defRPr sz="4400" kern="1200">
+                <a:solidFill>
+                  <a:schemeClr val="tx1"/>
+                </a:solidFill>
+                <a:latin typeface="+mj-lt"/>
+                <a:ea typeface="+mj-ea"/>
+                <a:cs typeface="+mj-cs"/>
+              </a:defRPr>
+            </a:lvl1pPr>
+          </a:lstStyle>
+          <a:p>
+            <a:r>
+              <a:rPr lang="ru-RU" sz="5400" b="1" dirty="0">
+                <a:latin typeface="Bahnschrift SemiBold Condensed" panose="020B0502040204020203" pitchFamily="34" charset="0"/>
+              </a:rPr>
+              <a:t>ПЛАНЫ ПО РАЗВИТИЮ</a:t>
+            </a:r>
+            <a:r>
+              <a:rPr lang="ru-RU" sz="6000" b="1" dirty="0">
+                <a:latin typeface="Bahnschrift SemiBold Condensed" panose="020B0502040204020203" pitchFamily="34" charset="0"/>
+              </a:rPr>
+              <a:t>:</a:t>
+            </a:r>
+          </a:p>
+        </p:txBody>
+      </p:sp>
+      <p:pic>
+        <p:nvPicPr>
+          <p:cNvPr id="6" name="Рисунок 5"/>
+          <p:cNvPicPr>
+            <a:picLocks noChangeAspect="1"/>
+          </p:cNvPicPr>
+          <p:nvPr/>
+        </p:nvPicPr>
+        <p:blipFill>
+          <a:blip r:embed="rId2">
+            <a:extLst>
+              <a:ext uri="{28A0092B-C50C-407E-A947-70E740481C1C}">
+                <a14:useLocalDpi xmlns:a14="http://schemas.microsoft.com/office/drawing/2010/main" val="0"/>
+              </a:ext>
+            </a:extLst>
+          </a:blip>
+          <a:stretch>
+            <a:fillRect/>
+          </a:stretch>
+        </p:blipFill>
+        <p:spPr>
+          <a:xfrm>
+            <a:off x="0" y="0"/>
+            <a:ext cx="2677886" cy="6883602"/>
+          </a:xfrm>
+          <a:prstGeom prst="rect">
+            <a:avLst/>
+          </a:prstGeom>
+        </p:spPr>
+      </p:pic>
+      <p:pic>
+        <p:nvPicPr>
+          <p:cNvPr id="7" name="Рисунок 6"/>
+          <p:cNvPicPr>
+            <a:picLocks noChangeAspect="1"/>
+          </p:cNvPicPr>
+          <p:nvPr/>
+        </p:nvPicPr>
+        <p:blipFill>
+          <a:blip r:embed="rId3">
+            <a:extLst>
+              <a:ext uri="{28A0092B-C50C-407E-A947-70E740481C1C}">
+                <a14:useLocalDpi xmlns:a14="http://schemas.microsoft.com/office/drawing/2010/main" val="0"/>
+              </a:ext>
+            </a:extLst>
+          </a:blip>
+          <a:stretch>
+            <a:fillRect/>
+          </a:stretch>
+        </p:blipFill>
+        <p:spPr>
+          <a:xfrm>
+            <a:off x="9577710" y="5813313"/>
+            <a:ext cx="2614290" cy="1044687"/>
+          </a:xfrm>
+          <a:prstGeom prst="rect">
+            <a:avLst/>
+          </a:prstGeom>
+        </p:spPr>
+      </p:pic>
+      <p:sp>
+        <p:nvSpPr>
+          <p:cNvPr id="9" name="Объект 2"/>
+          <p:cNvSpPr>
+            <a:spLocks noGrp="1"/>
+          </p:cNvSpPr>
+          <p:nvPr>
+            <p:ph idx="1"/>
+          </p:nvPr>
+        </p:nvSpPr>
+        <p:spPr>
+          <a:xfrm>
+            <a:off x="3108958" y="1455556"/>
+            <a:ext cx="8715103" cy="4883740"/>
+          </a:xfrm>
+        </p:spPr>
+        <p:txBody>
+          <a:bodyPr>
+            <a:normAutofit/>
+          </a:bodyPr>
+          <a:lstStyle/>
+          <a:p>
+            <a:pPr marL="0" indent="0">
+              <a:buNone/>
+            </a:pPr>
+            <a:r>
+              <a:rPr lang="ru-RU" sz="4500" dirty="0"/>
+              <a:t>В планах более глубокое изучение технологий, использующихся в построении приложений, основанных на </a:t>
+            </a:r>
+            <a:r>
+              <a:rPr lang="ru-RU" sz="4500" dirty="0" err="1"/>
+              <a:t>микросервисной</a:t>
+            </a:r>
+            <a:r>
+              <a:rPr lang="ru-RU" sz="4500" dirty="0"/>
+              <a:t> архитектуре. </a:t>
+            </a:r>
+          </a:p>
+          <a:p>
+            <a:pPr marL="0" indent="0">
+              <a:buNone/>
+            </a:pPr>
+            <a:endParaRPr lang="ru-RU" sz="3600" dirty="0"/>
+          </a:p>
+          <a:p>
+            <a:endParaRPr lang="ru-RU" dirty="0"/>
+          </a:p>
+        </p:txBody>
+      </p:sp>
+    </p:spTree>
+    <p:extLst>
+      <p:ext uri="{BB962C8B-B14F-4D97-AF65-F5344CB8AC3E}">
+        <p14:creationId xmlns:p14="http://schemas.microsoft.com/office/powerpoint/2010/main" val="2954689009"/>
+      </p:ext>
+    </p:extLst>
+  </p:cSld>
+  <p:clrMapOvr>
+    <a:masterClrMapping/>
+  </p:clrMapOvr>
+</p:sld>
+</file>
+
 <file path=ppt/slides/slide2.xml><?xml version="1.0" encoding="utf-8"?>
 <p:sld xmlns:a="http://schemas.openxmlformats.org/drawingml/2006/main" xmlns:r="http://schemas.openxmlformats.org/officeDocument/2006/relationships" xmlns:p="http://schemas.openxmlformats.org/presentationml/2006/main">
   <p:cSld>
@@ -3345,7 +3541,13 @@
       </p:grpSpPr>
       <p:sp>
         <p:nvSpPr>
-          <p:cNvPr id="2" name="Заголовок 1"/>
+          <p:cNvPr id="4" name="Заголовок 1">
+            <a:extLst>
+              <a:ext uri="{FF2B5EF4-FFF2-40B4-BE49-F238E27FC236}">
+                <a16:creationId xmlns:a16="http://schemas.microsoft.com/office/drawing/2014/main" id="{07D4E6BE-757C-47CD-B5B0-F351A1E1F373}"/>
+              </a:ext>
+            </a:extLst>
+          </p:cNvPr>
           <p:cNvSpPr>
             <a:spLocks noGrp="1"/>
           </p:cNvSpPr>
@@ -3355,7 +3557,7 @@
         </p:nvSpPr>
         <p:spPr>
           <a:xfrm>
-            <a:off x="4846320" y="129993"/>
+            <a:off x="4833257" y="0"/>
             <a:ext cx="8493034" cy="1325563"/>
           </a:xfrm>
         </p:spPr>
@@ -3366,192 +3568,29 @@
           <a:lstStyle/>
           <a:p>
             <a:r>
+              <a:rPr lang="ru-RU" sz="5400" b="1" dirty="0">
+                <a:latin typeface="Bahnschrift SemiBold Condensed" panose="020B0502040204020203" pitchFamily="34" charset="0"/>
+              </a:rPr>
+              <a:t>ЦЕЛИ ПРОЕКТА</a:t>
+            </a:r>
+            <a:r>
               <a:rPr lang="ru-RU" sz="6000" b="1" dirty="0">
                 <a:latin typeface="Bahnschrift SemiBold Condensed" panose="020B0502040204020203" pitchFamily="34" charset="0"/>
               </a:rPr>
-              <a:t>ТЕХНОЛОГИИ:</a:t>
-            </a:r>
-          </a:p>
-        </p:txBody>
-      </p:sp>
-      <p:sp>
-        <p:nvSpPr>
-          <p:cNvPr id="3" name="Объект 2"/>
-          <p:cNvSpPr>
-            <a:spLocks noGrp="1"/>
-          </p:cNvSpPr>
-          <p:nvPr>
-            <p:ph idx="1"/>
-          </p:nvPr>
-        </p:nvSpPr>
-        <p:spPr>
-          <a:xfrm>
-            <a:off x="3108958" y="1455556"/>
-            <a:ext cx="8715103" cy="4883740"/>
-          </a:xfrm>
-        </p:spPr>
-        <p:txBody>
-          <a:bodyPr>
-            <a:normAutofit/>
-          </a:bodyPr>
-          <a:lstStyle/>
-          <a:p>
-            <a:pPr marL="0" indent="0">
-              <a:buNone/>
-            </a:pPr>
-            <a:r>
-              <a:rPr lang="en-US" sz="4000" dirty="0">
-                <a:latin typeface="Arial" panose="020B0604020202020204" pitchFamily="34" charset="0"/>
-                <a:cs typeface="Arial" panose="020B0604020202020204" pitchFamily="34" charset="0"/>
-              </a:rPr>
-              <a:t>1. UI </a:t>
-            </a:r>
-            <a:r>
-              <a:rPr lang="ru-RU" sz="4000" dirty="0">
-                <a:latin typeface="Arial" panose="020B0604020202020204" pitchFamily="34" charset="0"/>
-                <a:cs typeface="Arial" panose="020B0604020202020204" pitchFamily="34" charset="0"/>
-              </a:rPr>
-              <a:t>на </a:t>
-            </a:r>
-            <a:r>
-              <a:rPr lang="en-US" sz="4000" dirty="0">
-                <a:latin typeface="Arial" panose="020B0604020202020204" pitchFamily="34" charset="0"/>
-                <a:cs typeface="Arial" panose="020B0604020202020204" pitchFamily="34" charset="0"/>
-              </a:rPr>
-              <a:t>JQuery </a:t>
-            </a:r>
-            <a:r>
-              <a:rPr lang="ru-RU" sz="4000" dirty="0">
-                <a:latin typeface="Arial" panose="020B0604020202020204" pitchFamily="34" charset="0"/>
-                <a:cs typeface="Arial" panose="020B0604020202020204" pitchFamily="34" charset="0"/>
-              </a:rPr>
-              <a:t>+ </a:t>
-            </a:r>
-            <a:r>
-              <a:rPr lang="en-US" sz="4000" dirty="0" err="1">
-                <a:latin typeface="Arial" panose="020B0604020202020204" pitchFamily="34" charset="0"/>
-                <a:cs typeface="Arial" panose="020B0604020202020204" pitchFamily="34" charset="0"/>
-              </a:rPr>
-              <a:t>Thymeleaf</a:t>
-            </a:r>
-            <a:r>
-              <a:rPr lang="en-US" sz="4000" dirty="0">
-                <a:latin typeface="Arial" panose="020B0604020202020204" pitchFamily="34" charset="0"/>
-                <a:cs typeface="Arial" panose="020B0604020202020204" pitchFamily="34" charset="0"/>
-              </a:rPr>
-              <a:t>.</a:t>
-            </a:r>
-            <a:br>
-              <a:rPr lang="en-US" sz="4000" dirty="0">
-                <a:latin typeface="Arial" panose="020B0604020202020204" pitchFamily="34" charset="0"/>
-                <a:cs typeface="Arial" panose="020B0604020202020204" pitchFamily="34" charset="0"/>
-              </a:rPr>
-            </a:br>
-            <a:r>
-              <a:rPr lang="en-US" sz="4000" dirty="0">
-                <a:latin typeface="Arial" panose="020B0604020202020204" pitchFamily="34" charset="0"/>
-                <a:cs typeface="Arial" panose="020B0604020202020204" pitchFamily="34" charset="0"/>
-              </a:rPr>
-              <a:t>2. </a:t>
-            </a:r>
-            <a:r>
-              <a:rPr lang="ru-RU" sz="4000" dirty="0">
-                <a:latin typeface="Arial" panose="020B0604020202020204" pitchFamily="34" charset="0"/>
-                <a:cs typeface="Arial" panose="020B0604020202020204" pitchFamily="34" charset="0"/>
-              </a:rPr>
-              <a:t>Серверная часть на </a:t>
-            </a:r>
-            <a:r>
-              <a:rPr lang="en-US" sz="4000" dirty="0">
-                <a:latin typeface="Arial" panose="020B0604020202020204" pitchFamily="34" charset="0"/>
-                <a:cs typeface="Arial" panose="020B0604020202020204" pitchFamily="34" charset="0"/>
-              </a:rPr>
-              <a:t>Spring Boot 2.0 + Hibernate+ H2</a:t>
-            </a:r>
-            <a:br>
-              <a:rPr lang="en-US" sz="4000" dirty="0">
-                <a:latin typeface="Arial" panose="020B0604020202020204" pitchFamily="34" charset="0"/>
-                <a:cs typeface="Arial" panose="020B0604020202020204" pitchFamily="34" charset="0"/>
-              </a:rPr>
-            </a:br>
-            <a:r>
-              <a:rPr lang="en-US" sz="4000" dirty="0">
-                <a:latin typeface="Arial" panose="020B0604020202020204" pitchFamily="34" charset="0"/>
-                <a:cs typeface="Arial" panose="020B0604020202020204" pitchFamily="34" charset="0"/>
-              </a:rPr>
-              <a:t>3. Actuator, </a:t>
-            </a:r>
-            <a:r>
-              <a:rPr lang="en-US" sz="4000" dirty="0" err="1">
-                <a:latin typeface="Arial" panose="020B0604020202020204" pitchFamily="34" charset="0"/>
-                <a:cs typeface="Arial" panose="020B0604020202020204" pitchFamily="34" charset="0"/>
-              </a:rPr>
-              <a:t>Hystrix</a:t>
-            </a:r>
-            <a:r>
-              <a:rPr lang="en-US" sz="4000" dirty="0">
-                <a:latin typeface="Arial" panose="020B0604020202020204" pitchFamily="34" charset="0"/>
-                <a:cs typeface="Arial" panose="020B0604020202020204" pitchFamily="34" charset="0"/>
-              </a:rPr>
-              <a:t>.</a:t>
-            </a:r>
-            <a:br>
-              <a:rPr lang="en-US" sz="4000" dirty="0">
-                <a:latin typeface="Arial" panose="020B0604020202020204" pitchFamily="34" charset="0"/>
-                <a:cs typeface="Arial" panose="020B0604020202020204" pitchFamily="34" charset="0"/>
-              </a:rPr>
-            </a:br>
-            <a:r>
-              <a:rPr lang="en-US" sz="4000" dirty="0">
-                <a:latin typeface="Arial" panose="020B0604020202020204" pitchFamily="34" charset="0"/>
-                <a:cs typeface="Arial" panose="020B0604020202020204" pitchFamily="34" charset="0"/>
-              </a:rPr>
-              <a:t>4. </a:t>
-            </a:r>
-            <a:r>
-              <a:rPr lang="ru-RU" sz="4000" dirty="0">
-                <a:latin typeface="Arial" panose="020B0604020202020204" pitchFamily="34" charset="0"/>
-                <a:cs typeface="Arial" panose="020B0604020202020204" pitchFamily="34" charset="0"/>
-              </a:rPr>
-              <a:t>Тестирование(</a:t>
-            </a:r>
-            <a:r>
-              <a:rPr lang="en-US" sz="4000" dirty="0" err="1">
-                <a:latin typeface="Arial" panose="020B0604020202020204" pitchFamily="34" charset="0"/>
-                <a:cs typeface="Arial" panose="020B0604020202020204" pitchFamily="34" charset="0"/>
-              </a:rPr>
-              <a:t>JUnit,Mockito</a:t>
-            </a:r>
-            <a:r>
-              <a:rPr lang="en-US" sz="4000" dirty="0">
-                <a:latin typeface="Arial" panose="020B0604020202020204" pitchFamily="34" charset="0"/>
-                <a:cs typeface="Arial" panose="020B0604020202020204" pitchFamily="34" charset="0"/>
-              </a:rPr>
-              <a:t>)</a:t>
-            </a:r>
-            <a:br>
-              <a:rPr lang="en-US" sz="4000" dirty="0">
-                <a:latin typeface="Arial" panose="020B0604020202020204" pitchFamily="34" charset="0"/>
-                <a:cs typeface="Arial" panose="020B0604020202020204" pitchFamily="34" charset="0"/>
-              </a:rPr>
-            </a:br>
-            <a:r>
-              <a:rPr lang="en-US" sz="4000" dirty="0">
-                <a:latin typeface="Arial" panose="020B0604020202020204" pitchFamily="34" charset="0"/>
-                <a:cs typeface="Arial" panose="020B0604020202020204" pitchFamily="34" charset="0"/>
-              </a:rPr>
-              <a:t>5. Docker.</a:t>
-            </a:r>
-            <a:endParaRPr lang="ru-RU" sz="4000" dirty="0">
-              <a:latin typeface="Arial" panose="020B0604020202020204" pitchFamily="34" charset="0"/>
-              <a:cs typeface="Arial" panose="020B0604020202020204" pitchFamily="34" charset="0"/>
-            </a:endParaRPr>
+              <a:t>:</a:t>
+            </a:r>
           </a:p>
         </p:txBody>
       </p:sp>
       <p:pic>
         <p:nvPicPr>
-          <p:cNvPr id="4" name="Рисунок 3"/>
+          <p:cNvPr id="5" name="Рисунок 4">
+            <a:extLst>
+              <a:ext uri="{FF2B5EF4-FFF2-40B4-BE49-F238E27FC236}">
+                <a16:creationId xmlns:a16="http://schemas.microsoft.com/office/drawing/2014/main" id="{099DDF37-3774-4DCD-9664-2373B4489D5E}"/>
+              </a:ext>
+            </a:extLst>
+          </p:cNvPr>
           <p:cNvPicPr>
             <a:picLocks noChangeAspect="1"/>
           </p:cNvPicPr>
@@ -3579,9 +3618,103 @@
           </a:prstGeom>
         </p:spPr>
       </p:pic>
+      <p:sp>
+        <p:nvSpPr>
+          <p:cNvPr id="7" name="Объект 2">
+            <a:extLst>
+              <a:ext uri="{FF2B5EF4-FFF2-40B4-BE49-F238E27FC236}">
+                <a16:creationId xmlns:a16="http://schemas.microsoft.com/office/drawing/2014/main" id="{C0A5B189-5357-4709-82B1-4450D0506DDB}"/>
+              </a:ext>
+            </a:extLst>
+          </p:cNvPr>
+          <p:cNvSpPr>
+            <a:spLocks noGrp="1"/>
+          </p:cNvSpPr>
+          <p:nvPr>
+            <p:ph idx="1"/>
+          </p:nvPr>
+        </p:nvSpPr>
+        <p:spPr>
+          <a:xfrm>
+            <a:off x="3108958" y="1941922"/>
+            <a:ext cx="8715103" cy="4397374"/>
+          </a:xfrm>
+        </p:spPr>
+        <p:txBody>
+          <a:bodyPr>
+            <a:normAutofit/>
+          </a:bodyPr>
+          <a:lstStyle/>
+          <a:p>
+            <a:pPr marL="914400" indent="-914400">
+              <a:buAutoNum type="arabicPeriod"/>
+            </a:pPr>
+            <a:r>
+              <a:rPr lang="ru-RU" sz="4800" dirty="0">
+                <a:latin typeface="Arial" panose="020B0604020202020204" pitchFamily="34" charset="0"/>
+                <a:cs typeface="Arial" panose="020B0604020202020204" pitchFamily="34" charset="0"/>
+              </a:rPr>
+              <a:t>Практическое применение </a:t>
+            </a:r>
+            <a:r>
+              <a:rPr lang="en-US" sz="4800" dirty="0" err="1">
+                <a:latin typeface="Arial" panose="020B0604020202020204" pitchFamily="34" charset="0"/>
+                <a:cs typeface="Arial" panose="020B0604020202020204" pitchFamily="34" charset="0"/>
+              </a:rPr>
+              <a:t>javastack</a:t>
+            </a:r>
+            <a:r>
+              <a:rPr lang="en-US" sz="4800" dirty="0">
+                <a:latin typeface="Arial" panose="020B0604020202020204" pitchFamily="34" charset="0"/>
+                <a:cs typeface="Arial" panose="020B0604020202020204" pitchFamily="34" charset="0"/>
+              </a:rPr>
+              <a:t> </a:t>
+            </a:r>
+            <a:r>
+              <a:rPr lang="ru-RU" sz="4800" dirty="0">
+                <a:latin typeface="Arial" panose="020B0604020202020204" pitchFamily="34" charset="0"/>
+                <a:cs typeface="Arial" panose="020B0604020202020204" pitchFamily="34" charset="0"/>
+              </a:rPr>
+              <a:t>технологий, пройденных на курсе</a:t>
+            </a:r>
+          </a:p>
+          <a:p>
+            <a:pPr marL="914400" indent="-914400">
+              <a:buAutoNum type="arabicPeriod"/>
+            </a:pPr>
+            <a:r>
+              <a:rPr lang="ru-RU" sz="4800" dirty="0">
+                <a:latin typeface="Arial" panose="020B0604020202020204" pitchFamily="34" charset="0"/>
+                <a:cs typeface="Arial" panose="020B0604020202020204" pitchFamily="34" charset="0"/>
+              </a:rPr>
+              <a:t>Освоение написания </a:t>
+            </a:r>
+            <a:r>
+              <a:rPr lang="en-US" sz="4800" dirty="0">
+                <a:latin typeface="Arial" panose="020B0604020202020204" pitchFamily="34" charset="0"/>
+                <a:cs typeface="Arial" panose="020B0604020202020204" pitchFamily="34" charset="0"/>
+              </a:rPr>
+              <a:t>web- </a:t>
+            </a:r>
+            <a:r>
+              <a:rPr lang="ru-RU" sz="4800" dirty="0">
+                <a:latin typeface="Arial" panose="020B0604020202020204" pitchFamily="34" charset="0"/>
+                <a:cs typeface="Arial" panose="020B0604020202020204" pitchFamily="34" charset="0"/>
+              </a:rPr>
+              <a:t>приложений</a:t>
+            </a:r>
+          </a:p>
+        </p:txBody>
+      </p:sp>
       <p:pic>
         <p:nvPicPr>
-          <p:cNvPr id="5" name="Рисунок 4"/>
+          <p:cNvPr id="8" name="Рисунок 7">
+            <a:extLst>
+              <a:ext uri="{FF2B5EF4-FFF2-40B4-BE49-F238E27FC236}">
+                <a16:creationId xmlns:a16="http://schemas.microsoft.com/office/drawing/2014/main" id="{A77D8E01-89BC-460B-BC66-99777A75137A}"/>
+              </a:ext>
+            </a:extLst>
+          </p:cNvPr>
           <p:cNvPicPr>
             <a:picLocks noChangeAspect="1"/>
           </p:cNvPicPr>
@@ -3612,7 +3745,7 @@
     </p:spTree>
     <p:extLst>
       <p:ext uri="{BB962C8B-B14F-4D97-AF65-F5344CB8AC3E}">
-        <p14:creationId xmlns:p14="http://schemas.microsoft.com/office/powerpoint/2010/main" val="1163862521"/>
+        <p14:creationId xmlns:p14="http://schemas.microsoft.com/office/powerpoint/2010/main" val="3670873491"/>
       </p:ext>
     </p:extLst>
   </p:cSld>
@@ -3641,7 +3774,7 @@
       </p:grpSpPr>
       <p:sp>
         <p:nvSpPr>
-          <p:cNvPr id="5" name="Заголовок 1"/>
+          <p:cNvPr id="2" name="Заголовок 1"/>
           <p:cNvSpPr>
             <a:spLocks noGrp="1"/>
           </p:cNvSpPr>
@@ -3651,7 +3784,7 @@
         </p:nvSpPr>
         <p:spPr>
           <a:xfrm>
-            <a:off x="4833257" y="0"/>
+            <a:off x="4846320" y="129993"/>
             <a:ext cx="8493034" cy="1325563"/>
           </a:xfrm>
         </p:spPr>
@@ -3662,26 +3795,253 @@
           <a:lstStyle/>
           <a:p>
             <a:r>
-              <a:rPr lang="ru-RU" sz="5400" b="1">
+              <a:rPr lang="ru-RU" sz="6000" b="1" dirty="0">
                 <a:latin typeface="Bahnschrift SemiBold Condensed" panose="020B0502040204020203" pitchFamily="34" charset="0"/>
               </a:rPr>
-              <a:t>СХЕМА ДАННЫХ</a:t>
-            </a:r>
-            <a:r>
-              <a:rPr lang="ru-RU" sz="6000" b="1">
-                <a:latin typeface="Bahnschrift SemiBold Condensed" panose="020B0502040204020203" pitchFamily="34" charset="0"/>
-              </a:rPr>
-              <a:t>:</a:t>
-            </a:r>
-            <a:endParaRPr lang="ru-RU" sz="6000" b="1" dirty="0">
-              <a:latin typeface="Bahnschrift SemiBold Condensed" panose="020B0502040204020203" pitchFamily="34" charset="0"/>
+              <a:t>ТЕХНОЛОГИИ:</a:t>
+            </a:r>
+          </a:p>
+        </p:txBody>
+      </p:sp>
+      <p:sp>
+        <p:nvSpPr>
+          <p:cNvPr id="3" name="Объект 2"/>
+          <p:cNvSpPr>
+            <a:spLocks noGrp="1"/>
+          </p:cNvSpPr>
+          <p:nvPr>
+            <p:ph idx="1"/>
+          </p:nvPr>
+        </p:nvSpPr>
+        <p:spPr>
+          <a:xfrm>
+            <a:off x="3108958" y="1455556"/>
+            <a:ext cx="8715103" cy="4883740"/>
+          </a:xfrm>
+        </p:spPr>
+        <p:txBody>
+          <a:bodyPr>
+            <a:normAutofit/>
+          </a:bodyPr>
+          <a:lstStyle/>
+          <a:p>
+            <a:pPr marL="742950" indent="-742950">
+              <a:buAutoNum type="arabicPeriod"/>
+            </a:pPr>
+            <a:r>
+              <a:rPr lang="en-US" sz="4000" dirty="0">
+                <a:latin typeface="Arial" panose="020B0604020202020204" pitchFamily="34" charset="0"/>
+                <a:cs typeface="Arial" panose="020B0604020202020204" pitchFamily="34" charset="0"/>
+              </a:rPr>
+              <a:t>UI </a:t>
+            </a:r>
+            <a:r>
+              <a:rPr lang="ru-RU" sz="4000" dirty="0">
+                <a:latin typeface="Arial" panose="020B0604020202020204" pitchFamily="34" charset="0"/>
+                <a:cs typeface="Arial" panose="020B0604020202020204" pitchFamily="34" charset="0"/>
+              </a:rPr>
+              <a:t>на </a:t>
+            </a:r>
+            <a:r>
+              <a:rPr lang="en-US" sz="4000" dirty="0">
+                <a:latin typeface="Arial" panose="020B0604020202020204" pitchFamily="34" charset="0"/>
+                <a:cs typeface="Arial" panose="020B0604020202020204" pitchFamily="34" charset="0"/>
+              </a:rPr>
+              <a:t>JQuery </a:t>
+            </a:r>
+            <a:r>
+              <a:rPr lang="ru-RU" sz="4000" dirty="0">
+                <a:latin typeface="Arial" panose="020B0604020202020204" pitchFamily="34" charset="0"/>
+                <a:cs typeface="Arial" panose="020B0604020202020204" pitchFamily="34" charset="0"/>
+              </a:rPr>
+              <a:t>+ </a:t>
+            </a:r>
+            <a:r>
+              <a:rPr lang="en-US" sz="4000" dirty="0" err="1">
+                <a:latin typeface="Arial" panose="020B0604020202020204" pitchFamily="34" charset="0"/>
+                <a:cs typeface="Arial" panose="020B0604020202020204" pitchFamily="34" charset="0"/>
+              </a:rPr>
+              <a:t>Thymeleaf</a:t>
+            </a:r>
+            <a:r>
+              <a:rPr lang="en-US" sz="4000" dirty="0">
+                <a:latin typeface="Arial" panose="020B0604020202020204" pitchFamily="34" charset="0"/>
+                <a:cs typeface="Arial" panose="020B0604020202020204" pitchFamily="34" charset="0"/>
+              </a:rPr>
+              <a:t>.</a:t>
+            </a:r>
+            <a:endParaRPr lang="ru-RU" sz="4000" dirty="0">
+              <a:latin typeface="Arial" panose="020B0604020202020204" pitchFamily="34" charset="0"/>
+              <a:cs typeface="Arial" panose="020B0604020202020204" pitchFamily="34" charset="0"/>
+            </a:endParaRPr>
+          </a:p>
+          <a:p>
+            <a:pPr marL="742950" indent="-742950">
+              <a:buAutoNum type="arabicPeriod"/>
+            </a:pPr>
+            <a:r>
+              <a:rPr lang="ru-RU" sz="4000" dirty="0">
+                <a:latin typeface="Arial" panose="020B0604020202020204" pitchFamily="34" charset="0"/>
+                <a:cs typeface="Arial" panose="020B0604020202020204" pitchFamily="34" charset="0"/>
+              </a:rPr>
+              <a:t>Серверная  часть  на  </a:t>
+            </a:r>
+            <a:r>
+              <a:rPr lang="en-US" sz="4000" dirty="0">
+                <a:latin typeface="Arial" panose="020B0604020202020204" pitchFamily="34" charset="0"/>
+                <a:cs typeface="Arial" panose="020B0604020202020204" pitchFamily="34" charset="0"/>
+              </a:rPr>
+              <a:t>Spring</a:t>
+            </a:r>
+            <a:endParaRPr lang="ru-RU" sz="4000" dirty="0">
+              <a:latin typeface="Arial" panose="020B0604020202020204" pitchFamily="34" charset="0"/>
+              <a:cs typeface="Arial" panose="020B0604020202020204" pitchFamily="34" charset="0"/>
+            </a:endParaRPr>
+          </a:p>
+          <a:p>
+            <a:pPr marL="0" indent="0">
+              <a:buNone/>
+            </a:pPr>
+            <a:r>
+              <a:rPr lang="ru-RU" sz="4000" dirty="0">
+                <a:latin typeface="Arial" panose="020B0604020202020204" pitchFamily="34" charset="0"/>
+                <a:cs typeface="Arial" panose="020B0604020202020204" pitchFamily="34" charset="0"/>
+              </a:rPr>
+              <a:t>    </a:t>
+            </a:r>
+            <a:r>
+              <a:rPr lang="en-US" sz="4000" dirty="0">
+                <a:latin typeface="Arial" panose="020B0604020202020204" pitchFamily="34" charset="0"/>
+                <a:cs typeface="Arial" panose="020B0604020202020204" pitchFamily="34" charset="0"/>
+              </a:rPr>
+              <a:t> Boot </a:t>
+            </a:r>
+            <a:r>
+              <a:rPr lang="ru-RU" sz="4000" dirty="0">
+                <a:latin typeface="Arial" panose="020B0604020202020204" pitchFamily="34" charset="0"/>
+                <a:cs typeface="Arial" panose="020B0604020202020204" pitchFamily="34" charset="0"/>
+              </a:rPr>
+              <a:t> </a:t>
+            </a:r>
+            <a:r>
+              <a:rPr lang="en-US" sz="4000" dirty="0">
+                <a:latin typeface="Arial" panose="020B0604020202020204" pitchFamily="34" charset="0"/>
+                <a:cs typeface="Arial" panose="020B0604020202020204" pitchFamily="34" charset="0"/>
+              </a:rPr>
+              <a:t>2.0 + Hibernate+ H2</a:t>
+            </a:r>
+            <a:br>
+              <a:rPr lang="en-US" sz="4000" dirty="0">
+                <a:latin typeface="Arial" panose="020B0604020202020204" pitchFamily="34" charset="0"/>
+                <a:cs typeface="Arial" panose="020B0604020202020204" pitchFamily="34" charset="0"/>
+              </a:rPr>
+            </a:br>
+            <a:r>
+              <a:rPr lang="en-US" sz="4000" dirty="0">
+                <a:latin typeface="Arial" panose="020B0604020202020204" pitchFamily="34" charset="0"/>
+                <a:cs typeface="Arial" panose="020B0604020202020204" pitchFamily="34" charset="0"/>
+              </a:rPr>
+              <a:t>3.</a:t>
+            </a:r>
+            <a:r>
+              <a:rPr lang="ru-RU" sz="4000" dirty="0">
+                <a:latin typeface="Arial" panose="020B0604020202020204" pitchFamily="34" charset="0"/>
+                <a:cs typeface="Arial" panose="020B0604020202020204" pitchFamily="34" charset="0"/>
+              </a:rPr>
+              <a:t> </a:t>
+            </a:r>
+            <a:r>
+              <a:rPr lang="en-US" sz="4000" dirty="0">
+                <a:latin typeface="Arial" panose="020B0604020202020204" pitchFamily="34" charset="0"/>
+                <a:cs typeface="Arial" panose="020B0604020202020204" pitchFamily="34" charset="0"/>
+              </a:rPr>
+              <a:t> Actuator, </a:t>
+            </a:r>
+            <a:r>
+              <a:rPr lang="en-US" sz="4000" dirty="0" err="1">
+                <a:latin typeface="Arial" panose="020B0604020202020204" pitchFamily="34" charset="0"/>
+                <a:cs typeface="Arial" panose="020B0604020202020204" pitchFamily="34" charset="0"/>
+              </a:rPr>
+              <a:t>Hystrix</a:t>
+            </a:r>
+            <a:r>
+              <a:rPr lang="en-US" sz="4000" dirty="0">
+                <a:latin typeface="Arial" panose="020B0604020202020204" pitchFamily="34" charset="0"/>
+                <a:cs typeface="Arial" panose="020B0604020202020204" pitchFamily="34" charset="0"/>
+              </a:rPr>
+              <a:t>.</a:t>
+            </a:r>
+            <a:br>
+              <a:rPr lang="en-US" sz="4000" dirty="0">
+                <a:latin typeface="Arial" panose="020B0604020202020204" pitchFamily="34" charset="0"/>
+                <a:cs typeface="Arial" panose="020B0604020202020204" pitchFamily="34" charset="0"/>
+              </a:rPr>
+            </a:br>
+            <a:r>
+              <a:rPr lang="en-US" sz="4000" dirty="0">
+                <a:latin typeface="Arial" panose="020B0604020202020204" pitchFamily="34" charset="0"/>
+                <a:cs typeface="Arial" panose="020B0604020202020204" pitchFamily="34" charset="0"/>
+              </a:rPr>
+              <a:t>4. </a:t>
+            </a:r>
+            <a:r>
+              <a:rPr lang="ru-RU" sz="4000" dirty="0">
+                <a:latin typeface="Arial" panose="020B0604020202020204" pitchFamily="34" charset="0"/>
+                <a:cs typeface="Arial" panose="020B0604020202020204" pitchFamily="34" charset="0"/>
+              </a:rPr>
+              <a:t> Тестирование(</a:t>
+            </a:r>
+            <a:r>
+              <a:rPr lang="en-US" sz="4000" dirty="0" err="1">
+                <a:latin typeface="Arial" panose="020B0604020202020204" pitchFamily="34" charset="0"/>
+                <a:cs typeface="Arial" panose="020B0604020202020204" pitchFamily="34" charset="0"/>
+              </a:rPr>
+              <a:t>JUnit,Mockito</a:t>
+            </a:r>
+            <a:r>
+              <a:rPr lang="en-US" sz="4000" dirty="0">
+                <a:latin typeface="Arial" panose="020B0604020202020204" pitchFamily="34" charset="0"/>
+                <a:cs typeface="Arial" panose="020B0604020202020204" pitchFamily="34" charset="0"/>
+              </a:rPr>
+              <a:t>)</a:t>
+            </a:r>
+            <a:br>
+              <a:rPr lang="en-US" sz="4000" dirty="0">
+                <a:latin typeface="Arial" panose="020B0604020202020204" pitchFamily="34" charset="0"/>
+                <a:cs typeface="Arial" panose="020B0604020202020204" pitchFamily="34" charset="0"/>
+              </a:rPr>
+            </a:br>
+            <a:r>
+              <a:rPr lang="en-US" sz="4000" dirty="0">
+                <a:latin typeface="Arial" panose="020B0604020202020204" pitchFamily="34" charset="0"/>
+                <a:cs typeface="Arial" panose="020B0604020202020204" pitchFamily="34" charset="0"/>
+              </a:rPr>
+              <a:t>5. </a:t>
+            </a:r>
+            <a:r>
+              <a:rPr lang="ru-RU" sz="4000" dirty="0">
+                <a:latin typeface="Arial" panose="020B0604020202020204" pitchFamily="34" charset="0"/>
+                <a:cs typeface="Arial" panose="020B0604020202020204" pitchFamily="34" charset="0"/>
+              </a:rPr>
+              <a:t> </a:t>
+            </a:r>
+            <a:r>
+              <a:rPr lang="en-US" sz="4000" dirty="0">
+                <a:latin typeface="Arial" panose="020B0604020202020204" pitchFamily="34" charset="0"/>
+                <a:cs typeface="Arial" panose="020B0604020202020204" pitchFamily="34" charset="0"/>
+              </a:rPr>
+              <a:t>Docker.</a:t>
+            </a:r>
+            <a:endParaRPr lang="ru-RU" sz="4000" dirty="0">
+              <a:latin typeface="Arial" panose="020B0604020202020204" pitchFamily="34" charset="0"/>
+              <a:cs typeface="Arial" panose="020B0604020202020204" pitchFamily="34" charset="0"/>
             </a:endParaRPr>
           </a:p>
         </p:txBody>
       </p:sp>
       <p:pic>
         <p:nvPicPr>
-          <p:cNvPr id="6" name="Рисунок 5"/>
+          <p:cNvPr id="4" name="Рисунок 3"/>
           <p:cNvPicPr>
             <a:picLocks noChangeAspect="1"/>
           </p:cNvPicPr>
@@ -3701,8 +4061,8 @@
         </p:blipFill>
         <p:spPr>
           <a:xfrm>
-            <a:off x="3234221" y="1235095"/>
-            <a:ext cx="8548476" cy="5622905"/>
+            <a:off x="0" y="0"/>
+            <a:ext cx="2479767" cy="6858000"/>
           </a:xfrm>
           <a:prstGeom prst="rect">
             <a:avLst/>
@@ -3711,7 +4071,7 @@
       </p:pic>
       <p:pic>
         <p:nvPicPr>
-          <p:cNvPr id="7" name="Рисунок 6"/>
+          <p:cNvPr id="5" name="Рисунок 4"/>
           <p:cNvPicPr>
             <a:picLocks noChangeAspect="1"/>
           </p:cNvPicPr>
@@ -3731,8 +4091,8 @@
         </p:blipFill>
         <p:spPr>
           <a:xfrm>
-            <a:off x="0" y="0"/>
-            <a:ext cx="2677886" cy="6883602"/>
+            <a:off x="9577710" y="5813313"/>
+            <a:ext cx="2614290" cy="1044687"/>
           </a:xfrm>
           <a:prstGeom prst="rect">
             <a:avLst/>
@@ -3742,7 +4102,7 @@
     </p:spTree>
     <p:extLst>
       <p:ext uri="{BB962C8B-B14F-4D97-AF65-F5344CB8AC3E}">
-        <p14:creationId xmlns:p14="http://schemas.microsoft.com/office/powerpoint/2010/main" val="1928025934"/>
+        <p14:creationId xmlns:p14="http://schemas.microsoft.com/office/powerpoint/2010/main" val="1163862521"/>
       </p:ext>
     </p:extLst>
   </p:cSld>
@@ -3771,7 +4131,7 @@
       </p:grpSpPr>
       <p:sp>
         <p:nvSpPr>
-          <p:cNvPr id="4" name="Заголовок 1"/>
+          <p:cNvPr id="5" name="Заголовок 1"/>
           <p:cNvSpPr>
             <a:spLocks noGrp="1"/>
           </p:cNvSpPr>
@@ -3781,13 +4141,13 @@
         </p:nvSpPr>
         <p:spPr>
           <a:xfrm>
-            <a:off x="4833257" y="0"/>
-            <a:ext cx="8493034" cy="1325563"/>
+            <a:off x="2976321" y="794141"/>
+            <a:ext cx="8493034" cy="913073"/>
           </a:xfrm>
         </p:spPr>
         <p:txBody>
           <a:bodyPr>
-            <a:normAutofit/>
+            <a:normAutofit fontScale="90000"/>
           </a:bodyPr>
           <a:lstStyle/>
           <a:p>
@@ -3795,7 +4155,7 @@
               <a:rPr lang="ru-RU" sz="5400" b="1" dirty="0">
                 <a:latin typeface="Bahnschrift SemiBold Condensed" panose="020B0502040204020203" pitchFamily="34" charset="0"/>
               </a:rPr>
-              <a:t>ОПИСАНИЕ ПРОЕКТА</a:t>
+              <a:t>СХЕМА ДАННЫХ</a:t>
             </a:r>
             <a:r>
               <a:rPr lang="ru-RU" sz="6000" b="1" dirty="0">
@@ -3828,89 +4188,17 @@
         </p:blipFill>
         <p:spPr>
           <a:xfrm>
-            <a:off x="0" y="0"/>
-            <a:ext cx="2677886" cy="6883602"/>
+            <a:off x="3465479" y="1575168"/>
+            <a:ext cx="7840492" cy="5157216"/>
           </a:xfrm>
           <a:prstGeom prst="rect">
             <a:avLst/>
           </a:prstGeom>
         </p:spPr>
       </p:pic>
-      <p:sp>
-        <p:nvSpPr>
-          <p:cNvPr id="7" name="Объект 2"/>
-          <p:cNvSpPr>
-            <a:spLocks noGrp="1"/>
-          </p:cNvSpPr>
-          <p:nvPr>
-            <p:ph idx="1"/>
-          </p:nvPr>
-        </p:nvSpPr>
-        <p:spPr>
-          <a:xfrm>
-            <a:off x="3108958" y="1455556"/>
-            <a:ext cx="8715103" cy="4883740"/>
-          </a:xfrm>
-        </p:spPr>
-        <p:txBody>
-          <a:bodyPr>
-            <a:normAutofit fontScale="92500"/>
-          </a:bodyPr>
-          <a:lstStyle/>
-          <a:p>
-            <a:pPr marL="0" indent="0">
-              <a:buNone/>
-            </a:pPr>
-            <a:r>
-              <a:rPr lang="ru-RU" sz="3600" dirty="0"/>
-              <a:t>В проекте реализована возможность: </a:t>
-            </a:r>
-            <a:br>
-              <a:rPr lang="ru-RU" sz="3600" dirty="0"/>
-            </a:br>
-            <a:r>
-              <a:rPr lang="ru-RU" sz="3600" dirty="0"/>
-              <a:t>- добавлять/редактировать/удалять клиента</a:t>
-            </a:r>
-            <a:br>
-              <a:rPr lang="ru-RU" sz="3600" dirty="0"/>
-            </a:br>
-            <a:r>
-              <a:rPr lang="ru-RU" sz="3600" dirty="0"/>
-              <a:t>- добавлять/редактировать/удалять адреса клиента</a:t>
-            </a:r>
-          </a:p>
-          <a:p>
-            <a:pPr marL="0" indent="0">
-              <a:buNone/>
-            </a:pPr>
-            <a:r>
-              <a:rPr lang="ru-RU" sz="3600" dirty="0"/>
-              <a:t>- добавлять/редактировать/удалять контакты клиента</a:t>
-            </a:r>
-            <a:br>
-              <a:rPr lang="ru-RU" sz="3600" dirty="0"/>
-            </a:br>
-            <a:r>
-              <a:rPr lang="ru-RU" sz="3600" dirty="0"/>
-              <a:t>- добавлять/редактировать/удалять договоры клиента</a:t>
-            </a:r>
-            <a:br>
-              <a:rPr lang="ru-RU" sz="3600" dirty="0"/>
-            </a:br>
-            <a:r>
-              <a:rPr lang="ru-RU" sz="3600" dirty="0"/>
-              <a:t>- добавлять/редактировать/удалять торговые площадки договора</a:t>
-            </a:r>
-          </a:p>
-          <a:p>
-            <a:endParaRPr lang="ru-RU" dirty="0"/>
-          </a:p>
-        </p:txBody>
-      </p:sp>
       <p:pic>
         <p:nvPicPr>
-          <p:cNvPr id="8" name="Рисунок 7"/>
+          <p:cNvPr id="7" name="Рисунок 6"/>
           <p:cNvPicPr>
             <a:picLocks noChangeAspect="1"/>
           </p:cNvPicPr>
@@ -3930,18 +4218,80 @@
         </p:blipFill>
         <p:spPr>
           <a:xfrm>
-            <a:off x="9577710" y="5813313"/>
-            <a:ext cx="2614290" cy="1044687"/>
+            <a:off x="0" y="0"/>
+            <a:ext cx="2677886" cy="6883602"/>
           </a:xfrm>
           <a:prstGeom prst="rect">
             <a:avLst/>
           </a:prstGeom>
         </p:spPr>
       </p:pic>
+      <p:sp>
+        <p:nvSpPr>
+          <p:cNvPr id="8" name="Заголовок 1">
+            <a:extLst>
+              <a:ext uri="{FF2B5EF4-FFF2-40B4-BE49-F238E27FC236}">
+                <a16:creationId xmlns:a16="http://schemas.microsoft.com/office/drawing/2014/main" id="{7F597051-D0E0-4495-A0EE-D6822488EA01}"/>
+              </a:ext>
+            </a:extLst>
+          </p:cNvPr>
+          <p:cNvSpPr txBox="1">
+            <a:spLocks/>
+          </p:cNvSpPr>
+          <p:nvPr/>
+        </p:nvSpPr>
+        <p:spPr>
+          <a:xfrm>
+            <a:off x="2976321" y="63472"/>
+            <a:ext cx="8493034" cy="735518"/>
+          </a:xfrm>
+          <a:prstGeom prst="rect">
+            <a:avLst/>
+          </a:prstGeom>
+        </p:spPr>
+        <p:txBody>
+          <a:bodyPr vert="horz" lIns="91440" tIns="45720" rIns="91440" bIns="45720" rtlCol="0" anchor="ctr">
+            <a:normAutofit fontScale="92500" lnSpcReduction="20000"/>
+          </a:bodyPr>
+          <a:lstStyle>
+            <a:lvl1pPr algn="l" defTabSz="914400" rtl="0" eaLnBrk="1" latinLnBrk="0" hangingPunct="1">
+              <a:lnSpc>
+                <a:spcPct val="90000"/>
+              </a:lnSpc>
+              <a:spcBef>
+                <a:spcPct val="0"/>
+              </a:spcBef>
+              <a:buNone/>
+              <a:defRPr sz="4400" kern="1200">
+                <a:solidFill>
+                  <a:schemeClr val="tx1"/>
+                </a:solidFill>
+                <a:latin typeface="+mj-lt"/>
+                <a:ea typeface="+mj-ea"/>
+                <a:cs typeface="+mj-cs"/>
+              </a:defRPr>
+            </a:lvl1pPr>
+          </a:lstStyle>
+          <a:p>
+            <a:r>
+              <a:rPr lang="ru-RU" sz="5400" b="1" dirty="0">
+                <a:latin typeface="Bahnschrift SemiBold Condensed" panose="020B0502040204020203" pitchFamily="34" charset="0"/>
+              </a:rPr>
+              <a:t>АРХИТЕКТУРА</a:t>
+            </a:r>
+            <a:r>
+              <a:rPr lang="ru-RU" sz="6000" b="1" dirty="0">
+                <a:latin typeface="Bahnschrift SemiBold Condensed" panose="020B0502040204020203" pitchFamily="34" charset="0"/>
+              </a:rPr>
+              <a:t>: трехзвенная</a:t>
+            </a:r>
+          </a:p>
+        </p:txBody>
+      </p:sp>
     </p:spTree>
     <p:extLst>
       <p:ext uri="{BB962C8B-B14F-4D97-AF65-F5344CB8AC3E}">
-        <p14:creationId xmlns:p14="http://schemas.microsoft.com/office/powerpoint/2010/main" val="3885802387"/>
+        <p14:creationId xmlns:p14="http://schemas.microsoft.com/office/powerpoint/2010/main" val="1928025934"/>
       </p:ext>
     </p:extLst>
   </p:cSld>
@@ -3980,7 +4330,7 @@
         </p:nvSpPr>
         <p:spPr>
           <a:xfrm>
-            <a:off x="3200400" y="117566"/>
+            <a:off x="4833257" y="0"/>
             <a:ext cx="8493034" cy="1325563"/>
           </a:xfrm>
         </p:spPr>
@@ -3994,7 +4344,7 @@
               <a:rPr lang="ru-RU" sz="5400" b="1" dirty="0">
                 <a:latin typeface="Bahnschrift SemiBold Condensed" panose="020B0502040204020203" pitchFamily="34" charset="0"/>
               </a:rPr>
-              <a:t>ОСНОВНАЯ СТРАНИЦА</a:t>
+              <a:t>ОПИСАНИЕ ПРОЕКТА</a:t>
             </a:r>
             <a:r>
               <a:rPr lang="ru-RU" sz="6000" b="1" dirty="0">
@@ -4007,7 +4357,7 @@
       </p:sp>
       <p:pic>
         <p:nvPicPr>
-          <p:cNvPr id="5" name="Рисунок 4"/>
+          <p:cNvPr id="6" name="Рисунок 5"/>
           <p:cNvPicPr>
             <a:picLocks noChangeAspect="1"/>
           </p:cNvPicPr>
@@ -4027,8 +4377,110 @@
         </p:blipFill>
         <p:spPr>
           <a:xfrm>
-            <a:off x="561701" y="1599863"/>
-            <a:ext cx="11236679" cy="4382925"/>
+            <a:off x="0" y="0"/>
+            <a:ext cx="2677886" cy="6883602"/>
+          </a:xfrm>
+          <a:prstGeom prst="rect">
+            <a:avLst/>
+          </a:prstGeom>
+        </p:spPr>
+      </p:pic>
+      <p:sp>
+        <p:nvSpPr>
+          <p:cNvPr id="7" name="Объект 2"/>
+          <p:cNvSpPr>
+            <a:spLocks noGrp="1"/>
+          </p:cNvSpPr>
+          <p:nvPr>
+            <p:ph idx="1"/>
+          </p:nvPr>
+        </p:nvSpPr>
+        <p:spPr>
+          <a:xfrm>
+            <a:off x="3108958" y="1455556"/>
+            <a:ext cx="8715103" cy="4883740"/>
+          </a:xfrm>
+        </p:spPr>
+        <p:txBody>
+          <a:bodyPr>
+            <a:normAutofit fontScale="92500"/>
+          </a:bodyPr>
+          <a:lstStyle/>
+          <a:p>
+            <a:pPr marL="0" indent="0">
+              <a:buNone/>
+            </a:pPr>
+            <a:r>
+              <a:rPr lang="ru-RU" sz="3600" dirty="0"/>
+              <a:t>В проекте реализована возможность: </a:t>
+            </a:r>
+            <a:br>
+              <a:rPr lang="ru-RU" sz="3600" dirty="0"/>
+            </a:br>
+            <a:r>
+              <a:rPr lang="ru-RU" sz="3600" dirty="0"/>
+              <a:t>- добавлять/редактировать/удалять клиента</a:t>
+            </a:r>
+            <a:br>
+              <a:rPr lang="ru-RU" sz="3600" dirty="0"/>
+            </a:br>
+            <a:r>
+              <a:rPr lang="ru-RU" sz="3600" dirty="0"/>
+              <a:t>- добавлять/редактировать/удалять адреса клиента</a:t>
+            </a:r>
+          </a:p>
+          <a:p>
+            <a:pPr marL="0" indent="0">
+              <a:buNone/>
+            </a:pPr>
+            <a:r>
+              <a:rPr lang="ru-RU" sz="3600" dirty="0"/>
+              <a:t>- добавлять/редактировать/удалять контакты клиента</a:t>
+            </a:r>
+            <a:br>
+              <a:rPr lang="ru-RU" sz="3600" dirty="0"/>
+            </a:br>
+            <a:r>
+              <a:rPr lang="ru-RU" sz="3600" dirty="0"/>
+              <a:t>- добавлять/редактировать/удалять договоры клиента</a:t>
+            </a:r>
+            <a:br>
+              <a:rPr lang="ru-RU" sz="3600" dirty="0"/>
+            </a:br>
+            <a:r>
+              <a:rPr lang="ru-RU" sz="3600" dirty="0"/>
+              <a:t>- добавлять/редактировать/удалять торговые площадки договора</a:t>
+            </a:r>
+          </a:p>
+          <a:p>
+            <a:endParaRPr lang="ru-RU" dirty="0"/>
+          </a:p>
+        </p:txBody>
+      </p:sp>
+      <p:pic>
+        <p:nvPicPr>
+          <p:cNvPr id="8" name="Рисунок 7"/>
+          <p:cNvPicPr>
+            <a:picLocks noChangeAspect="1"/>
+          </p:cNvPicPr>
+          <p:nvPr/>
+        </p:nvPicPr>
+        <p:blipFill>
+          <a:blip r:embed="rId3">
+            <a:extLst>
+              <a:ext uri="{28A0092B-C50C-407E-A947-70E740481C1C}">
+                <a14:useLocalDpi xmlns:a14="http://schemas.microsoft.com/office/drawing/2010/main" val="0"/>
+              </a:ext>
+            </a:extLst>
+          </a:blip>
+          <a:stretch>
+            <a:fillRect/>
+          </a:stretch>
+        </p:blipFill>
+        <p:spPr>
+          <a:xfrm>
+            <a:off x="9577710" y="5813313"/>
+            <a:ext cx="2614290" cy="1044687"/>
           </a:xfrm>
           <a:prstGeom prst="rect">
             <a:avLst/>
@@ -4038,7 +4490,7 @@
     </p:spTree>
     <p:extLst>
       <p:ext uri="{BB962C8B-B14F-4D97-AF65-F5344CB8AC3E}">
-        <p14:creationId xmlns:p14="http://schemas.microsoft.com/office/powerpoint/2010/main" val="4279437739"/>
+        <p14:creationId xmlns:p14="http://schemas.microsoft.com/office/powerpoint/2010/main" val="3885802387"/>
       </p:ext>
     </p:extLst>
   </p:cSld>
@@ -4068,49 +4520,30 @@
       <p:sp>
         <p:nvSpPr>
           <p:cNvPr id="4" name="Заголовок 1"/>
-          <p:cNvSpPr txBox="1">
-            <a:spLocks/>
-          </p:cNvSpPr>
-          <p:nvPr/>
-        </p:nvSpPr>
-        <p:spPr>
-          <a:xfrm>
-            <a:off x="3370217" y="45404"/>
+          <p:cNvSpPr>
+            <a:spLocks noGrp="1"/>
+          </p:cNvSpPr>
+          <p:nvPr>
+            <p:ph type="title"/>
+          </p:nvPr>
+        </p:nvSpPr>
+        <p:spPr>
+          <a:xfrm>
+            <a:off x="3200400" y="117566"/>
             <a:ext cx="8493034" cy="1325563"/>
           </a:xfrm>
-          <a:prstGeom prst="rect">
-            <a:avLst/>
-          </a:prstGeom>
-        </p:spPr>
-        <p:txBody>
-          <a:bodyPr vert="horz" lIns="91440" tIns="45720" rIns="91440" bIns="45720" rtlCol="0" anchor="ctr">
+        </p:spPr>
+        <p:txBody>
+          <a:bodyPr>
             <a:normAutofit/>
           </a:bodyPr>
-          <a:lstStyle>
-            <a:lvl1pPr algn="l" defTabSz="914400" rtl="0" eaLnBrk="1" latinLnBrk="0" hangingPunct="1">
-              <a:lnSpc>
-                <a:spcPct val="90000"/>
-              </a:lnSpc>
-              <a:spcBef>
-                <a:spcPct val="0"/>
-              </a:spcBef>
-              <a:buNone/>
-              <a:defRPr sz="4400" kern="1200">
-                <a:solidFill>
-                  <a:schemeClr val="tx1"/>
-                </a:solidFill>
-                <a:latin typeface="+mj-lt"/>
-                <a:ea typeface="+mj-ea"/>
-                <a:cs typeface="+mj-cs"/>
-              </a:defRPr>
-            </a:lvl1pPr>
-          </a:lstStyle>
+          <a:lstStyle/>
           <a:p>
             <a:r>
               <a:rPr lang="ru-RU" sz="5400" b="1" dirty="0">
                 <a:latin typeface="Bahnschrift SemiBold Condensed" panose="020B0502040204020203" pitchFamily="34" charset="0"/>
               </a:rPr>
-              <a:t>КАРТОЧКА КЛИЕНТА</a:t>
+              <a:t>ОСНОВНАЯ СТРАНИЦА</a:t>
             </a:r>
             <a:r>
               <a:rPr lang="ru-RU" sz="6000" b="1" dirty="0">
@@ -4143,8 +4576,8 @@
         </p:blipFill>
         <p:spPr>
           <a:xfrm>
-            <a:off x="418012" y="1370967"/>
-            <a:ext cx="11659932" cy="4585294"/>
+            <a:off x="561701" y="1599863"/>
+            <a:ext cx="11236679" cy="4382925"/>
           </a:xfrm>
           <a:prstGeom prst="rect">
             <a:avLst/>
@@ -4154,7 +4587,7 @@
     </p:spTree>
     <p:extLst>
       <p:ext uri="{BB962C8B-B14F-4D97-AF65-F5344CB8AC3E}">
-        <p14:creationId xmlns:p14="http://schemas.microsoft.com/office/powerpoint/2010/main" val="3878148386"/>
+        <p14:creationId xmlns:p14="http://schemas.microsoft.com/office/powerpoint/2010/main" val="4279437739"/>
       </p:ext>
     </p:extLst>
   </p:cSld>
@@ -4226,7 +4659,7 @@
               <a:rPr lang="ru-RU" sz="5400" b="1" dirty="0">
                 <a:latin typeface="Bahnschrift SemiBold Condensed" panose="020B0502040204020203" pitchFamily="34" charset="0"/>
               </a:rPr>
-              <a:t>СПИСОК ДОГОВОРОВ</a:t>
+              <a:t>КАРТОЧКА КЛИЕНТА</a:t>
             </a:r>
             <a:r>
               <a:rPr lang="ru-RU" sz="6000" b="1" dirty="0">
@@ -4259,8 +4692,8 @@
         </p:blipFill>
         <p:spPr>
           <a:xfrm>
-            <a:off x="130628" y="1370967"/>
-            <a:ext cx="11945863" cy="4521472"/>
+            <a:off x="418012" y="1370967"/>
+            <a:ext cx="11659932" cy="4585294"/>
           </a:xfrm>
           <a:prstGeom prst="rect">
             <a:avLst/>
@@ -4270,7 +4703,7 @@
     </p:spTree>
     <p:extLst>
       <p:ext uri="{BB962C8B-B14F-4D97-AF65-F5344CB8AC3E}">
-        <p14:creationId xmlns:p14="http://schemas.microsoft.com/office/powerpoint/2010/main" val="2458172276"/>
+        <p14:creationId xmlns:p14="http://schemas.microsoft.com/office/powerpoint/2010/main" val="3878148386"/>
       </p:ext>
     </p:extLst>
   </p:cSld>
@@ -4342,7 +4775,7 @@
               <a:rPr lang="ru-RU" sz="5400" b="1" dirty="0">
                 <a:latin typeface="Bahnschrift SemiBold Condensed" panose="020B0502040204020203" pitchFamily="34" charset="0"/>
               </a:rPr>
-              <a:t>КАРТОЧКА ДОГОВОРА</a:t>
+              <a:t>СПИСОК ДОГОВОРОВ</a:t>
             </a:r>
             <a:r>
               <a:rPr lang="ru-RU" sz="6000" b="1" dirty="0">
@@ -4375,8 +4808,8 @@
         </p:blipFill>
         <p:spPr>
           <a:xfrm>
-            <a:off x="209279" y="1370967"/>
-            <a:ext cx="11653972" cy="4402816"/>
+            <a:off x="130628" y="1370967"/>
+            <a:ext cx="11945863" cy="4521472"/>
           </a:xfrm>
           <a:prstGeom prst="rect">
             <a:avLst/>
@@ -4386,7 +4819,7 @@
     </p:spTree>
     <p:extLst>
       <p:ext uri="{BB962C8B-B14F-4D97-AF65-F5344CB8AC3E}">
-        <p14:creationId xmlns:p14="http://schemas.microsoft.com/office/powerpoint/2010/main" val="1368157881"/>
+        <p14:creationId xmlns:p14="http://schemas.microsoft.com/office/powerpoint/2010/main" val="2458172276"/>
       </p:ext>
     </p:extLst>
   </p:cSld>
@@ -4415,7 +4848,7 @@
       </p:grpSpPr>
       <p:sp>
         <p:nvSpPr>
-          <p:cNvPr id="5" name="Заголовок 1"/>
+          <p:cNvPr id="4" name="Заголовок 1"/>
           <p:cNvSpPr txBox="1">
             <a:spLocks/>
           </p:cNvSpPr>
@@ -4423,7 +4856,7 @@
         </p:nvSpPr>
         <p:spPr>
           <a:xfrm>
-            <a:off x="4532812" y="0"/>
+            <a:off x="3370217" y="45404"/>
             <a:ext cx="8493034" cy="1325563"/>
           </a:xfrm>
           <a:prstGeom prst="rect">
@@ -4458,7 +4891,7 @@
               <a:rPr lang="ru-RU" sz="5400" b="1" dirty="0">
                 <a:latin typeface="Bahnschrift SemiBold Condensed" panose="020B0502040204020203" pitchFamily="34" charset="0"/>
               </a:rPr>
-              <a:t>ПЛАНЫ ПО РАЗВИТИЮ</a:t>
+              <a:t>КАРТОЧКА ДОГОВОРА</a:t>
             </a:r>
             <a:r>
               <a:rPr lang="ru-RU" sz="6000" b="1" dirty="0">
@@ -4471,7 +4904,7 @@
       </p:sp>
       <p:pic>
         <p:nvPicPr>
-          <p:cNvPr id="6" name="Рисунок 5"/>
+          <p:cNvPr id="5" name="Рисунок 4"/>
           <p:cNvPicPr>
             <a:picLocks noChangeAspect="1"/>
           </p:cNvPicPr>
@@ -4491,97 +4924,18 @@
         </p:blipFill>
         <p:spPr>
           <a:xfrm>
-            <a:off x="0" y="0"/>
-            <a:ext cx="2677886" cy="6883602"/>
+            <a:off x="209279" y="1370967"/>
+            <a:ext cx="11653972" cy="4402816"/>
           </a:xfrm>
           <a:prstGeom prst="rect">
             <a:avLst/>
           </a:prstGeom>
         </p:spPr>
       </p:pic>
-      <p:pic>
-        <p:nvPicPr>
-          <p:cNvPr id="7" name="Рисунок 6"/>
-          <p:cNvPicPr>
-            <a:picLocks noChangeAspect="1"/>
-          </p:cNvPicPr>
-          <p:nvPr/>
-        </p:nvPicPr>
-        <p:blipFill>
-          <a:blip r:embed="rId3">
-            <a:extLst>
-              <a:ext uri="{28A0092B-C50C-407E-A947-70E740481C1C}">
-                <a14:useLocalDpi xmlns:a14="http://schemas.microsoft.com/office/drawing/2010/main" val="0"/>
-              </a:ext>
-            </a:extLst>
-          </a:blip>
-          <a:stretch>
-            <a:fillRect/>
-          </a:stretch>
-        </p:blipFill>
-        <p:spPr>
-          <a:xfrm>
-            <a:off x="9577710" y="5813313"/>
-            <a:ext cx="2614290" cy="1044687"/>
-          </a:xfrm>
-          <a:prstGeom prst="rect">
-            <a:avLst/>
-          </a:prstGeom>
-        </p:spPr>
-      </p:pic>
-      <p:sp>
-        <p:nvSpPr>
-          <p:cNvPr id="9" name="Объект 2"/>
-          <p:cNvSpPr>
-            <a:spLocks noGrp="1"/>
-          </p:cNvSpPr>
-          <p:nvPr>
-            <p:ph idx="1"/>
-          </p:nvPr>
-        </p:nvSpPr>
-        <p:spPr>
-          <a:xfrm>
-            <a:off x="3108958" y="1455556"/>
-            <a:ext cx="8715103" cy="4883740"/>
-          </a:xfrm>
-        </p:spPr>
-        <p:txBody>
-          <a:bodyPr>
-            <a:normAutofit/>
-          </a:bodyPr>
-          <a:lstStyle/>
-          <a:p>
-            <a:pPr marL="0" indent="0">
-              <a:buNone/>
-            </a:pPr>
-            <a:r>
-              <a:rPr lang="ru-RU" sz="4500" dirty="0"/>
-              <a:t>В планах более глубокое изучение технологий, использующихся в построении приложений, основанных на </a:t>
-            </a:r>
-            <a:r>
-              <a:rPr lang="ru-RU" sz="4500" dirty="0" err="1"/>
-              <a:t>микросервисной</a:t>
-            </a:r>
-            <a:r>
-              <a:rPr lang="ru-RU" sz="4500" dirty="0"/>
-              <a:t> архитектуре. </a:t>
-            </a:r>
-          </a:p>
-          <a:p>
-            <a:pPr marL="0" indent="0">
-              <a:buNone/>
-            </a:pPr>
-            <a:endParaRPr lang="ru-RU" sz="3600" dirty="0"/>
-          </a:p>
-          <a:p>
-            <a:endParaRPr lang="ru-RU" dirty="0"/>
-          </a:p>
-        </p:txBody>
-      </p:sp>
     </p:spTree>
     <p:extLst>
       <p:ext uri="{BB962C8B-B14F-4D97-AF65-F5344CB8AC3E}">
-        <p14:creationId xmlns:p14="http://schemas.microsoft.com/office/powerpoint/2010/main" val="2954689009"/>
+        <p14:creationId xmlns:p14="http://schemas.microsoft.com/office/powerpoint/2010/main" val="1368157881"/>
       </p:ext>
     </p:extLst>
   </p:cSld>

</xml_diff>